<commit_message>
Exodo 15 e Tutorial GIT RBtech
</commit_message>
<xml_diff>
--- a/git_tutorial.pptx
+++ b/git_tutorial.pptx
@@ -296,7 +296,7 @@
             <a:fld id="{21E702E8-096E-465E-B654-2EC6D081EAA6}" type="datetimeFigureOut">
               <a:rPr lang="pt-BR" smtClean="0"/>
               <a:pPr/>
-              <a:t>7/5/2014</a:t>
+              <a:t>10/5/2014</a:t>
             </a:fld>
             <a:endParaRPr lang="pt-BR"/>
           </a:p>
@@ -463,7 +463,7 @@
             <a:fld id="{21E702E8-096E-465E-B654-2EC6D081EAA6}" type="datetimeFigureOut">
               <a:rPr lang="pt-BR" smtClean="0"/>
               <a:pPr/>
-              <a:t>7/5/2014</a:t>
+              <a:t>10/5/2014</a:t>
             </a:fld>
             <a:endParaRPr lang="pt-BR"/>
           </a:p>
@@ -640,7 +640,7 @@
             <a:fld id="{21E702E8-096E-465E-B654-2EC6D081EAA6}" type="datetimeFigureOut">
               <a:rPr lang="pt-BR" smtClean="0"/>
               <a:pPr/>
-              <a:t>7/5/2014</a:t>
+              <a:t>10/5/2014</a:t>
             </a:fld>
             <a:endParaRPr lang="pt-BR"/>
           </a:p>
@@ -807,7 +807,7 @@
             <a:fld id="{21E702E8-096E-465E-B654-2EC6D081EAA6}" type="datetimeFigureOut">
               <a:rPr lang="pt-BR" smtClean="0"/>
               <a:pPr/>
-              <a:t>7/5/2014</a:t>
+              <a:t>10/5/2014</a:t>
             </a:fld>
             <a:endParaRPr lang="pt-BR"/>
           </a:p>
@@ -1050,7 +1050,7 @@
             <a:fld id="{21E702E8-096E-465E-B654-2EC6D081EAA6}" type="datetimeFigureOut">
               <a:rPr lang="pt-BR" smtClean="0"/>
               <a:pPr/>
-              <a:t>7/5/2014</a:t>
+              <a:t>10/5/2014</a:t>
             </a:fld>
             <a:endParaRPr lang="pt-BR"/>
           </a:p>
@@ -1335,7 +1335,7 @@
             <a:fld id="{21E702E8-096E-465E-B654-2EC6D081EAA6}" type="datetimeFigureOut">
               <a:rPr lang="pt-BR" smtClean="0"/>
               <a:pPr/>
-              <a:t>7/5/2014</a:t>
+              <a:t>10/5/2014</a:t>
             </a:fld>
             <a:endParaRPr lang="pt-BR"/>
           </a:p>
@@ -1754,7 +1754,7 @@
             <a:fld id="{21E702E8-096E-465E-B654-2EC6D081EAA6}" type="datetimeFigureOut">
               <a:rPr lang="pt-BR" smtClean="0"/>
               <a:pPr/>
-              <a:t>7/5/2014</a:t>
+              <a:t>10/5/2014</a:t>
             </a:fld>
             <a:endParaRPr lang="pt-BR"/>
           </a:p>
@@ -1869,7 +1869,7 @@
             <a:fld id="{21E702E8-096E-465E-B654-2EC6D081EAA6}" type="datetimeFigureOut">
               <a:rPr lang="pt-BR" smtClean="0"/>
               <a:pPr/>
-              <a:t>7/5/2014</a:t>
+              <a:t>10/5/2014</a:t>
             </a:fld>
             <a:endParaRPr lang="pt-BR"/>
           </a:p>
@@ -1961,7 +1961,7 @@
             <a:fld id="{21E702E8-096E-465E-B654-2EC6D081EAA6}" type="datetimeFigureOut">
               <a:rPr lang="pt-BR" smtClean="0"/>
               <a:pPr/>
-              <a:t>7/5/2014</a:t>
+              <a:t>10/5/2014</a:t>
             </a:fld>
             <a:endParaRPr lang="pt-BR"/>
           </a:p>
@@ -2235,7 +2235,7 @@
             <a:fld id="{21E702E8-096E-465E-B654-2EC6D081EAA6}" type="datetimeFigureOut">
               <a:rPr lang="pt-BR" smtClean="0"/>
               <a:pPr/>
-              <a:t>7/5/2014</a:t>
+              <a:t>10/5/2014</a:t>
             </a:fld>
             <a:endParaRPr lang="pt-BR"/>
           </a:p>
@@ -2485,7 +2485,7 @@
             <a:fld id="{21E702E8-096E-465E-B654-2EC6D081EAA6}" type="datetimeFigureOut">
               <a:rPr lang="pt-BR" smtClean="0"/>
               <a:pPr/>
-              <a:t>7/5/2014</a:t>
+              <a:t>10/5/2014</a:t>
             </a:fld>
             <a:endParaRPr lang="pt-BR"/>
           </a:p>
@@ -2695,7 +2695,7 @@
             <a:fld id="{21E702E8-096E-465E-B654-2EC6D081EAA6}" type="datetimeFigureOut">
               <a:rPr lang="pt-BR" smtClean="0"/>
               <a:pPr/>
-              <a:t>7/5/2014</a:t>
+              <a:t>10/5/2014</a:t>
             </a:fld>
             <a:endParaRPr lang="pt-BR"/>
           </a:p>
@@ -3076,16 +3076,37 @@
             <p:ph type="ctrTitle"/>
           </p:nvPr>
         </p:nvSpPr>
-        <p:spPr/>
-        <p:txBody>
-          <a:bodyPr/>
-          <a:lstStyle/>
-          <a:p>
-            <a:r>
-              <a:rPr lang="pt-BR" dirty="0" smtClean="0"/>
+        <p:spPr>
+          <a:xfrm>
+            <a:off x="642910" y="285728"/>
+            <a:ext cx="7772400" cy="1470025"/>
+          </a:xfrm>
+        </p:spPr>
+        <p:txBody>
+          <a:bodyPr>
+            <a:normAutofit/>
+          </a:bodyPr>
+          <a:lstStyle/>
+          <a:p>
+            <a:r>
+              <a:rPr lang="pt-BR" sz="8000" b="1" dirty="0" smtClean="0">
+                <a:solidFill>
+                  <a:schemeClr val="accent6">
+                    <a:lumMod val="75000"/>
+                  </a:schemeClr>
+                </a:solidFill>
+                <a:latin typeface="Bell MT" pitchFamily="18" charset="0"/>
+              </a:rPr>
               <a:t>GIT</a:t>
             </a:r>
-            <a:endParaRPr lang="pt-BR" dirty="0"/>
+            <a:endParaRPr lang="pt-BR" sz="8000" b="1" dirty="0">
+              <a:solidFill>
+                <a:schemeClr val="accent6">
+                  <a:lumMod val="75000"/>
+                </a:schemeClr>
+              </a:solidFill>
+              <a:latin typeface="Bell MT" pitchFamily="18" charset="0"/>
+            </a:endParaRPr>
           </a:p>
         </p:txBody>
       </p:sp>
@@ -3099,21 +3120,135 @@
             <p:ph type="subTitle" idx="1"/>
           </p:nvPr>
         </p:nvSpPr>
-        <p:spPr/>
-        <p:txBody>
-          <a:bodyPr/>
-          <a:lstStyle/>
-          <a:p>
-            <a:r>
-              <a:rPr lang="pt-BR" dirty="0" smtClean="0"/>
-              <a:t>Passo a Passo</a:t>
-            </a:r>
-          </a:p>
-          <a:p>
-            <a:r>
-              <a:rPr lang="pt-BR" dirty="0" smtClean="0"/>
+        <p:spPr>
+          <a:xfrm>
+            <a:off x="285720" y="2143116"/>
+            <a:ext cx="8715436" cy="4000528"/>
+          </a:xfrm>
+        </p:spPr>
+        <p:txBody>
+          <a:bodyPr>
+            <a:normAutofit fontScale="85000" lnSpcReduction="20000"/>
+          </a:bodyPr>
+          <a:lstStyle/>
+          <a:p>
+            <a:r>
+              <a:rPr lang="pt-BR" dirty="0" smtClean="0"/>
+              <a:t>Passo a </a:t>
+            </a:r>
+            <a:r>
+              <a:rPr lang="pt-BR" dirty="0" smtClean="0"/>
+              <a:t>Passo</a:t>
+            </a:r>
+          </a:p>
+          <a:p>
+            <a:endParaRPr lang="pt-BR" dirty="0" smtClean="0"/>
+          </a:p>
+          <a:p>
+            <a:r>
+              <a:rPr lang="pt-BR" sz="2200" dirty="0" smtClean="0">
+                <a:hlinkClick r:id="rId2"/>
+              </a:rPr>
+              <a:t>http://</a:t>
+            </a:r>
+            <a:r>
+              <a:rPr lang="pt-BR" sz="2200" dirty="0" smtClean="0">
+                <a:hlinkClick r:id="rId2"/>
+              </a:rPr>
+              <a:t>rypress.com/tutorials/git/introduction.html</a:t>
+            </a:r>
+            <a:endParaRPr lang="pt-BR" sz="2200" dirty="0" smtClean="0"/>
+          </a:p>
+          <a:p>
+            <a:endParaRPr lang="pt-BR" sz="2200" dirty="0" smtClean="0"/>
+          </a:p>
+          <a:p>
+            <a:r>
+              <a:rPr lang="pt-BR" sz="2400" dirty="0" smtClean="0">
+                <a:hlinkClick r:id="rId3"/>
+              </a:rPr>
+              <a:t>https://www.atlassian.com/git?utm_source=bitbucket&amp;utm_medium=link&amp;utm_campaign=homepage&amp;utm_content=free_git_tutorials</a:t>
+            </a:r>
+            <a:endParaRPr lang="pt-BR" sz="2400" dirty="0" smtClean="0"/>
+          </a:p>
+          <a:p>
+            <a:endParaRPr lang="pt-BR" sz="2200" dirty="0" smtClean="0">
+              <a:hlinkClick r:id="rId4"/>
+            </a:endParaRPr>
+          </a:p>
+          <a:p>
+            <a:r>
+              <a:rPr lang="pt-BR" sz="2200" dirty="0" smtClean="0">
+                <a:hlinkClick r:id="rId4"/>
+              </a:rPr>
+              <a:t>https</a:t>
+            </a:r>
+            <a:r>
+              <a:rPr lang="pt-BR" sz="2200" dirty="0" smtClean="0">
+                <a:hlinkClick r:id="rId4"/>
+              </a:rPr>
+              <a:t>://www.atlassian.com/git/tutorial/git-basics#!</a:t>
+            </a:r>
+            <a:r>
+              <a:rPr lang="pt-BR" sz="2200" dirty="0" smtClean="0">
+                <a:hlinkClick r:id="rId4"/>
+              </a:rPr>
+              <a:t>log</a:t>
+            </a:r>
+            <a:endParaRPr lang="pt-BR" sz="2200" dirty="0" smtClean="0"/>
+          </a:p>
+          <a:p>
+            <a:endParaRPr lang="pt-BR" sz="2200" dirty="0" smtClean="0"/>
+          </a:p>
+          <a:p>
+            <a:r>
+              <a:rPr lang="pt-BR" sz="2200" dirty="0" smtClean="0">
+                <a:hlinkClick r:id="rId5"/>
+              </a:rPr>
+              <a:t>http</a:t>
+            </a:r>
+            <a:r>
+              <a:rPr lang="pt-BR" sz="2200" dirty="0" smtClean="0">
+                <a:hlinkClick r:id="rId5"/>
+              </a:rPr>
+              <a:t>://www.git-scm.com/docs</a:t>
+            </a:r>
+            <a:r>
+              <a:rPr lang="pt-BR" sz="2200" dirty="0" smtClean="0"/>
+              <a:t>	</a:t>
+            </a:r>
+          </a:p>
+          <a:p>
+            <a:r>
+              <a:rPr lang="pt-BR" sz="2200" dirty="0" smtClean="0">
+                <a:hlinkClick r:id="rId6"/>
+              </a:rPr>
               <a:t>www.git-scm.com</a:t>
             </a:r>
+            <a:endParaRPr lang="pt-BR" sz="2200" dirty="0" smtClean="0"/>
+          </a:p>
+          <a:p>
+            <a:r>
+              <a:rPr lang="pt-BR" sz="2200" dirty="0" smtClean="0">
+                <a:hlinkClick r:id="rId7"/>
+              </a:rPr>
+              <a:t>http://www.git-scm.com/book</a:t>
+            </a:r>
+            <a:endParaRPr lang="pt-BR" sz="2200" dirty="0" smtClean="0"/>
+          </a:p>
+          <a:p>
+            <a:r>
+              <a:rPr lang="pt-BR" sz="2200" dirty="0" smtClean="0">
+                <a:hlinkClick r:id="rId8"/>
+              </a:rPr>
+              <a:t>http://www.git-scm.com/documentation</a:t>
+            </a:r>
+            <a:endParaRPr lang="pt-BR" sz="2200" dirty="0" smtClean="0"/>
+          </a:p>
+          <a:p>
+            <a:endParaRPr lang="pt-BR" dirty="0" smtClean="0"/>
+          </a:p>
+          <a:p>
             <a:endParaRPr lang="pt-BR" dirty="0"/>
           </a:p>
         </p:txBody>
@@ -3643,8 +3778,28 @@
         </p:nvSpPr>
         <p:spPr/>
         <p:txBody>
-          <a:bodyPr/>
-          <a:lstStyle/>
+          <a:bodyPr>
+            <a:normAutofit/>
+          </a:bodyPr>
+          <a:lstStyle/>
+          <a:p>
+            <a:r>
+              <a:rPr lang="pt-BR" dirty="0" smtClean="0">
+                <a:hlinkClick r:id="rId2"/>
+              </a:rPr>
+              <a:t>http://gitref.org/basic</a:t>
+            </a:r>
+            <a:r>
+              <a:rPr lang="pt-BR" dirty="0" smtClean="0">
+                <a:hlinkClick r:id="rId2"/>
+              </a:rPr>
+              <a:t>/</a:t>
+            </a:r>
+            <a:r>
+              <a:rPr lang="pt-BR" dirty="0" smtClean="0"/>
+              <a:t> </a:t>
+            </a:r>
+          </a:p>
           <a:p>
             <a:r>
               <a:rPr lang="pt-BR" dirty="0" smtClean="0"/>
@@ -3672,8 +3827,62 @@
             </a:r>
             <a:r>
               <a:rPr lang="pt-BR" dirty="0" smtClean="0"/>
-              <a:t> -&gt; limpa a tela</a:t>
-            </a:r>
+              <a:t> -&gt; limpa a </a:t>
+            </a:r>
+            <a:r>
+              <a:rPr lang="pt-BR" dirty="0" smtClean="0"/>
+              <a:t>tela</a:t>
+            </a:r>
+          </a:p>
+          <a:p>
+            <a:r>
+              <a:rPr lang="pt-BR" dirty="0" err="1" smtClean="0"/>
+              <a:t>Ls</a:t>
+            </a:r>
+            <a:r>
+              <a:rPr lang="pt-BR" dirty="0" smtClean="0"/>
+              <a:t> –a -&gt; Visualizar os arquivos da pasta e sub </a:t>
+            </a:r>
+            <a:r>
+              <a:rPr lang="pt-BR" dirty="0" err="1" smtClean="0"/>
+              <a:t>diretorios</a:t>
+            </a:r>
+            <a:r>
+              <a:rPr lang="pt-BR" dirty="0" smtClean="0"/>
+              <a:t> </a:t>
+            </a:r>
+            <a:r>
+              <a:rPr lang="pt-BR" dirty="0" smtClean="0">
+                <a:hlinkClick r:id="rId3"/>
+              </a:rPr>
+              <a:t>http://gitref.org/creating</a:t>
+            </a:r>
+            <a:r>
+              <a:rPr lang="pt-BR" dirty="0" smtClean="0">
+                <a:hlinkClick r:id="rId3"/>
+              </a:rPr>
+              <a:t>/</a:t>
+            </a:r>
+            <a:endParaRPr lang="pt-BR" dirty="0" smtClean="0"/>
+          </a:p>
+          <a:p>
+            <a:r>
+              <a:rPr lang="pt-BR" dirty="0" err="1" smtClean="0"/>
+              <a:t>Ls</a:t>
+            </a:r>
+            <a:r>
+              <a:rPr lang="pt-BR" dirty="0" smtClean="0"/>
+              <a:t>  -&gt; </a:t>
+            </a:r>
+            <a:r>
+              <a:rPr lang="pt-BR" dirty="0" err="1" smtClean="0"/>
+              <a:t>so</a:t>
+            </a:r>
+            <a:r>
+              <a:rPr lang="pt-BR" dirty="0" smtClean="0"/>
+              <a:t> arquivos</a:t>
+            </a:r>
+            <a:endParaRPr lang="pt-BR" dirty="0" smtClean="0"/>
           </a:p>
           <a:p>
             <a:endParaRPr lang="pt-BR" dirty="0"/>
@@ -4176,7 +4385,6 @@
               <a:rPr lang="pt-BR" dirty="0" smtClean="0"/>
               <a:t> do projeto”)</a:t>
             </a:r>
-            <a:endParaRPr lang="pt-BR" dirty="0" smtClean="0"/>
           </a:p>
           <a:p>
             <a:r>

</xml_diff>